<commit_message>
updated slides, removed redundant demo project
</commit_message>
<xml_diff>
--- a/Notes and Slides/CIS399Wk3Day1-HandlingData.pptx
+++ b/Notes and Slides/CIS399Wk3Day1-HandlingData.pptx
@@ -147,7 +147,7 @@
   </p:defaultTextStyle>
   <p:extLst>
     <p:ext uri="{EFAFB233-063F-42B5-8137-9DF3F51BA10A}">
-      <p15:sldGuideLst xmlns:p15="http://schemas.microsoft.com/office/powerpoint/2012/main" xmlns="">
+      <p15:sldGuideLst xmlns:p15="http://schemas.microsoft.com/office/powerpoint/2012/main">
         <p15:guide id="1" orient="horz" pos="2160">
           <p15:clr>
             <a:srgbClr val="A4A3A4"/>
@@ -246,7 +246,7 @@
           <a:p>
             <a:fld id="{1FC32AA1-1225-9048-80C3-2B6F58548154}" type="datetimeFigureOut">
               <a:rPr lang="en-US" smtClean="0"/>
-              <a:t>7/7/16</a:t>
+              <a:t>7/12/17</a:t>
             </a:fld>
             <a:endParaRPr lang="en-US"/>
           </a:p>
@@ -1487,7 +1487,7 @@
           <a:p>
             <a:fld id="{12110144-19AD-4D4E-902D-E18AF93089D3}" type="datetimeFigureOut">
               <a:rPr lang="en-US" smtClean="0"/>
-              <a:t>7/7/16</a:t>
+              <a:t>7/12/17</a:t>
             </a:fld>
             <a:endParaRPr lang="en-US"/>
           </a:p>
@@ -1657,7 +1657,7 @@
           <a:p>
             <a:fld id="{12110144-19AD-4D4E-902D-E18AF93089D3}" type="datetimeFigureOut">
               <a:rPr lang="en-US" smtClean="0"/>
-              <a:t>7/7/16</a:t>
+              <a:t>7/12/17</a:t>
             </a:fld>
             <a:endParaRPr lang="en-US"/>
           </a:p>
@@ -1837,7 +1837,7 @@
           <a:p>
             <a:fld id="{12110144-19AD-4D4E-902D-E18AF93089D3}" type="datetimeFigureOut">
               <a:rPr lang="en-US" smtClean="0"/>
-              <a:t>7/7/16</a:t>
+              <a:t>7/12/17</a:t>
             </a:fld>
             <a:endParaRPr lang="en-US"/>
           </a:p>
@@ -2007,7 +2007,7 @@
           <a:p>
             <a:fld id="{12110144-19AD-4D4E-902D-E18AF93089D3}" type="datetimeFigureOut">
               <a:rPr lang="en-US" smtClean="0"/>
-              <a:t>7/7/16</a:t>
+              <a:t>7/12/17</a:t>
             </a:fld>
             <a:endParaRPr lang="en-US"/>
           </a:p>
@@ -2253,7 +2253,7 @@
           <a:p>
             <a:fld id="{12110144-19AD-4D4E-902D-E18AF93089D3}" type="datetimeFigureOut">
               <a:rPr lang="en-US" smtClean="0"/>
-              <a:t>7/7/16</a:t>
+              <a:t>7/12/17</a:t>
             </a:fld>
             <a:endParaRPr lang="en-US"/>
           </a:p>
@@ -2541,7 +2541,7 @@
           <a:p>
             <a:fld id="{12110144-19AD-4D4E-902D-E18AF93089D3}" type="datetimeFigureOut">
               <a:rPr lang="en-US" smtClean="0"/>
-              <a:t>7/7/16</a:t>
+              <a:t>7/12/17</a:t>
             </a:fld>
             <a:endParaRPr lang="en-US"/>
           </a:p>
@@ -2963,7 +2963,7 @@
           <a:p>
             <a:fld id="{12110144-19AD-4D4E-902D-E18AF93089D3}" type="datetimeFigureOut">
               <a:rPr lang="en-US" smtClean="0"/>
-              <a:t>7/7/16</a:t>
+              <a:t>7/12/17</a:t>
             </a:fld>
             <a:endParaRPr lang="en-US"/>
           </a:p>
@@ -3081,7 +3081,7 @@
           <a:p>
             <a:fld id="{12110144-19AD-4D4E-902D-E18AF93089D3}" type="datetimeFigureOut">
               <a:rPr lang="en-US" smtClean="0"/>
-              <a:t>7/7/16</a:t>
+              <a:t>7/12/17</a:t>
             </a:fld>
             <a:endParaRPr lang="en-US"/>
           </a:p>
@@ -3176,7 +3176,7 @@
           <a:p>
             <a:fld id="{12110144-19AD-4D4E-902D-E18AF93089D3}" type="datetimeFigureOut">
               <a:rPr lang="en-US" smtClean="0"/>
-              <a:t>7/7/16</a:t>
+              <a:t>7/12/17</a:t>
             </a:fld>
             <a:endParaRPr lang="en-US"/>
           </a:p>
@@ -3453,7 +3453,7 @@
           <a:p>
             <a:fld id="{12110144-19AD-4D4E-902D-E18AF93089D3}" type="datetimeFigureOut">
               <a:rPr lang="en-US" smtClean="0"/>
-              <a:t>7/7/16</a:t>
+              <a:t>7/12/17</a:t>
             </a:fld>
             <a:endParaRPr lang="en-US"/>
           </a:p>
@@ -3706,7 +3706,7 @@
           <a:p>
             <a:fld id="{12110144-19AD-4D4E-902D-E18AF93089D3}" type="datetimeFigureOut">
               <a:rPr lang="en-US" smtClean="0"/>
-              <a:t>7/7/16</a:t>
+              <a:t>7/12/17</a:t>
             </a:fld>
             <a:endParaRPr lang="en-US"/>
           </a:p>
@@ -3937,7 +3937,7 @@
           <a:p>
             <a:fld id="{12110144-19AD-4D4E-902D-E18AF93089D3}" type="datetimeFigureOut">
               <a:rPr lang="en-US" smtClean="0"/>
-              <a:t>7/7/16</a:t>
+              <a:t>7/12/17</a:t>
             </a:fld>
             <a:endParaRPr lang="en-US"/>
           </a:p>
@@ -4451,20 +4451,12 @@
           <a:lstStyle/>
           <a:p>
             <a:r>
-              <a:rPr lang="en-US" b="1" dirty="0">
-                <a:solidFill>
-                  <a:srgbClr val="000090"/>
-                </a:solidFill>
-              </a:rPr>
-              <a:t>The classes used to work with </a:t>
-            </a:r>
-            <a:r>
               <a:rPr lang="en-US" b="1" dirty="0" smtClean="0">
                 <a:solidFill>
                   <a:srgbClr val="000090"/>
                 </a:solidFill>
               </a:rPr>
-              <a:t>SAX</a:t>
+              <a:t>SAX Classes Related to Parsing XML</a:t>
             </a:r>
             <a:endParaRPr lang="en-US" dirty="0">
               <a:solidFill>
@@ -4940,20 +4932,20 @@
           <p:nvPr>
             <p:extLst>
               <p:ext uri="{D42A27DB-BD31-4B8C-83A1-F6EECF244321}">
-                <p14:modId xmlns:p14="http://schemas.microsoft.com/office/powerpoint/2010/main" val="1330691890"/>
+                <p14:modId xmlns:p14="http://schemas.microsoft.com/office/powerpoint/2010/main" val="1360820768"/>
               </p:ext>
             </p:extLst>
           </p:nvPr>
         </p:nvGraphicFramePr>
         <p:xfrm>
-          <a:off x="919163" y="1655763"/>
-          <a:ext cx="7404100" cy="3644900"/>
+          <a:off x="302710" y="666974"/>
+          <a:ext cx="8538579" cy="4203383"/>
         </p:xfrm>
         <a:graphic>
           <a:graphicData uri="http://schemas.openxmlformats.org/presentationml/2006/ole">
             <mc:AlternateContent xmlns:mc="http://schemas.openxmlformats.org/markup-compatibility/2006">
               <mc:Choice xmlns:v="urn:schemas-microsoft-com:vml" Requires="v">
-                <p:oleObj spid="_x0000_s1040" name="Document" r:id="rId3" imgW="7404100" imgH="3644900" progId="Word.Document.12">
+                <p:oleObj spid="_x0000_s1045" name="Document" r:id="rId3" imgW="7404100" imgH="3644900" progId="Word.Document.12">
                   <p:embed/>
                 </p:oleObj>
               </mc:Choice>
@@ -4974,8 +4966,8 @@
                     </p:blipFill>
                     <p:spPr>
                       <a:xfrm>
-                        <a:off x="919163" y="1655763"/>
-                        <a:ext cx="7404100" cy="3644900"/>
+                        <a:off x="302710" y="666974"/>
+                        <a:ext cx="8538579" cy="4203383"/>
                       </a:xfrm>
                       <a:prstGeom prst="rect">
                         <a:avLst/>
@@ -4988,6 +4980,40 @@
           </a:graphicData>
         </a:graphic>
       </p:graphicFrame>
+      <p:sp>
+        <p:nvSpPr>
+          <p:cNvPr id="6" name="TextBox 5"/>
+          <p:cNvSpPr txBox="1"/>
+          <p:nvPr/>
+        </p:nvSpPr>
+        <p:spPr>
+          <a:xfrm>
+            <a:off x="1075765" y="5277355"/>
+            <a:ext cx="5744584" cy="369332"/>
+          </a:xfrm>
+          <a:prstGeom prst="rect">
+            <a:avLst/>
+          </a:prstGeom>
+          <a:noFill/>
+        </p:spPr>
+        <p:txBody>
+          <a:bodyPr wrap="square" rtlCol="0">
+            <a:spAutoFit/>
+          </a:bodyPr>
+          <a:lstStyle/>
+          <a:p>
+            <a:r>
+              <a:rPr lang="en-US" dirty="0" smtClean="0"/>
+              <a:t>Summary of code in </a:t>
+            </a:r>
+            <a:r>
+              <a:rPr lang="en-US" dirty="0" err="1" smtClean="0"/>
+              <a:t>FileIO.java</a:t>
+            </a:r>
+            <a:endParaRPr lang="en-US" dirty="0"/>
+          </a:p>
+        </p:txBody>
+      </p:sp>
     </p:spTree>
     <p:extLst>
       <p:ext uri="{BB962C8B-B14F-4D97-AF65-F5344CB8AC3E}">
@@ -5555,7 +5581,7 @@
           <a:graphicData uri="http://schemas.openxmlformats.org/presentationml/2006/ole">
             <mc:AlternateContent xmlns:mc="http://schemas.openxmlformats.org/markup-compatibility/2006">
               <mc:Choice xmlns:v="urn:schemas-microsoft-com:vml" Requires="v">
-                <p:oleObj spid="_x0000_s7184" name="Document" r:id="rId3" imgW="7518400" imgH="5257800" progId="Word.Document.12">
+                <p:oleObj spid="_x0000_s7189" name="Document" r:id="rId3" imgW="7518400" imgH="5257800" progId="Word.Document.12">
                   <p:embed/>
                 </p:oleObj>
               </mc:Choice>
@@ -5720,7 +5746,6 @@
               <a:rPr lang="en-US" dirty="0" smtClean="0"/>
               <a:t>, downloaded from the internet by the Newsreader app.</a:t>
             </a:r>
-            <a:endParaRPr lang="en-US" dirty="0" smtClean="0"/>
           </a:p>
           <a:p>
             <a:pPr marL="514350" indent="-514350">
@@ -5758,7 +5783,6 @@
               <a:rPr lang="en-US" i="1" dirty="0" smtClean="0"/>
               <a:t>Android Device Monitor</a:t>
             </a:r>
-            <a:endParaRPr lang="en-US" i="1" dirty="0" smtClean="0"/>
           </a:p>
           <a:p>
             <a:endParaRPr lang="en-US" dirty="0" smtClean="0"/>
@@ -5936,11 +5960,7 @@
             </a:pPr>
             <a:r>
               <a:rPr lang="en-US" dirty="0" smtClean="0"/>
-              <a:t>In Android Device Monitor, s</a:t>
-            </a:r>
-            <a:r>
-              <a:rPr lang="en-US" dirty="0" smtClean="0"/>
-              <a:t>elect the </a:t>
+              <a:t>In Android Device Monitor, select the </a:t>
             </a:r>
             <a:r>
               <a:rPr lang="en-US" i="1" dirty="0" smtClean="0"/>
@@ -6015,7 +6035,6 @@
               <a:rPr lang="en-US" dirty="0" smtClean="0"/>
               <a:t>View the file</a:t>
             </a:r>
-            <a:endParaRPr lang="en-US" dirty="0" smtClean="0"/>
           </a:p>
           <a:p>
             <a:endParaRPr lang="en-US" dirty="0" smtClean="0"/>
@@ -6155,11 +6174,7 @@
           <a:p>
             <a:r>
               <a:rPr lang="en-US" dirty="0" smtClean="0"/>
-              <a:t>Put breakpoints in the call-back </a:t>
-            </a:r>
-            <a:r>
-              <a:rPr lang="en-US" dirty="0" smtClean="0"/>
-              <a:t>methods. They will be called in this sequence:</a:t>
+              <a:t>Put breakpoints in the call-back methods. They will be called in this sequence:</a:t>
             </a:r>
           </a:p>
           <a:p>
@@ -6185,7 +6200,6 @@
               <a:rPr lang="en-US" dirty="0" smtClean="0"/>
               <a:t>Then these are called repeatedly:</a:t>
             </a:r>
-            <a:endParaRPr lang="en-US" dirty="0" smtClean="0"/>
           </a:p>
           <a:p>
             <a:pPr marL="1371600" lvl="2" indent="-514350">
@@ -6216,11 +6230,7 @@
             </a:r>
             <a:r>
               <a:rPr lang="en-US" dirty="0" smtClean="0"/>
-              <a:t>- </a:t>
-            </a:r>
-            <a:r>
-              <a:rPr lang="en-US" dirty="0" smtClean="0"/>
-              <a:t>called for each element with a value</a:t>
+              <a:t>- called for each element with a value</a:t>
             </a:r>
           </a:p>
           <a:p>
@@ -6412,7 +6422,7 @@
           <a:graphicData uri="http://schemas.openxmlformats.org/presentationml/2006/ole">
             <mc:AlternateContent xmlns:mc="http://schemas.openxmlformats.org/markup-compatibility/2006">
               <mc:Choice xmlns:v="urn:schemas-microsoft-com:vml" Requires="v">
-                <p:oleObj spid="_x0000_s8208" name="Document" r:id="rId3" imgW="6959600" imgH="5003800" progId="Word.Document.12">
+                <p:oleObj spid="_x0000_s8213" name="Document" r:id="rId3" imgW="6959600" imgH="5003800" progId="Word.Document.12">
                   <p:embed/>
                 </p:oleObj>
               </mc:Choice>
@@ -6611,7 +6621,7 @@
           <a:graphicData uri="http://schemas.openxmlformats.org/presentationml/2006/ole">
             <mc:AlternateContent xmlns:mc="http://schemas.openxmlformats.org/markup-compatibility/2006">
               <mc:Choice xmlns:v="urn:schemas-microsoft-com:vml" Requires="v">
-                <p:oleObj spid="_x0000_s9230" name="Document" r:id="rId3" imgW="7385143" imgH="5153726" progId="Word.Document.12">
+                <p:oleObj spid="_x0000_s9235" name="Document" r:id="rId3" imgW="7385143" imgH="5153726" progId="Word.Document.12">
                   <p:embed/>
                 </p:oleObj>
               </mc:Choice>
@@ -6810,7 +6820,7 @@
           <a:graphicData uri="http://schemas.openxmlformats.org/presentationml/2006/ole">
             <mc:AlternateContent xmlns:mc="http://schemas.openxmlformats.org/markup-compatibility/2006">
               <mc:Choice xmlns:v="urn:schemas-microsoft-com:vml" Requires="v">
-                <p:oleObj spid="_x0000_s10254" name="Document" r:id="rId3" imgW="7309115" imgH="4326518" progId="Word.Document.12">
+                <p:oleObj spid="_x0000_s10259" name="Document" r:id="rId3" imgW="7309115" imgH="4326518" progId="Word.Document.12">
                   <p:embed/>
                 </p:oleObj>
               </mc:Choice>
@@ -6923,7 +6933,7 @@
         </p:nvGraphicFramePr>
         <p:xfrm>
           <a:off x="457200" y="1600200"/>
-          <a:ext cx="3811200" cy="5152683"/>
+          <a:ext cx="3811200" cy="4725964"/>
         </p:xfrm>
         <a:graphic>
           <a:graphicData uri="http://schemas.openxmlformats.org/drawingml/2006/table">
@@ -7285,14 +7295,6 @@
                         <a:rPr lang="en-US" sz="2800" baseline="0" dirty="0" smtClean="0"/>
                         <a:t> apps, </a:t>
                       </a:r>
-                      <a:r>
-                        <a:rPr lang="en-US" sz="2800" u="none" baseline="0" dirty="0" smtClean="0">
-                          <a:solidFill>
-                            <a:schemeClr val="tx1"/>
-                          </a:solidFill>
-                        </a:rPr>
-                        <a:t>Fragments</a:t>
-                      </a:r>
                       <a:endParaRPr lang="en-US" sz="2800" u="none" dirty="0" smtClean="0">
                         <a:solidFill>
                           <a:schemeClr val="tx1"/>
@@ -7324,14 +7326,14 @@
             <p:ph sz="half" idx="2"/>
             <p:extLst>
               <p:ext uri="{D42A27DB-BD31-4B8C-83A1-F6EECF244321}">
-                <p14:modId xmlns:p14="http://schemas.microsoft.com/office/powerpoint/2010/main" val="825041224"/>
+                <p14:modId xmlns:p14="http://schemas.microsoft.com/office/powerpoint/2010/main" val="1066181124"/>
               </p:ext>
             </p:extLst>
           </p:nvPr>
         </p:nvGraphicFramePr>
         <p:xfrm>
           <a:off x="4412426" y="1600200"/>
-          <a:ext cx="4274374" cy="3866745"/>
+          <a:ext cx="4274374" cy="4725963"/>
         </p:xfrm>
         <a:graphic>
           <a:graphicData uri="http://schemas.openxmlformats.org/drawingml/2006/table">
@@ -7343,7 +7345,7 @@
                 <a:gridCol w="589196"/>
                 <a:gridCol w="3685178"/>
               </a:tblGrid>
-              <a:tr h="375862">
+              <a:tr h="386924">
                 <a:tc>
                   <a:txBody>
                     <a:bodyPr/>
@@ -7373,7 +7375,66 @@
                   <a:tcPr/>
                 </a:tc>
               </a:tr>
-              <a:tr h="957676">
+              <a:tr h="745418">
+                <a:tc>
+                  <a:txBody>
+                    <a:bodyPr/>
+                    <a:lstStyle/>
+                    <a:p>
+                      <a:r>
+                        <a:rPr lang="en-US" sz="2800" dirty="0" smtClean="0"/>
+                        <a:t>3</a:t>
+                      </a:r>
+                      <a:endParaRPr lang="en-US" sz="2800" dirty="0"/>
+                    </a:p>
+                  </a:txBody>
+                  <a:tcPr>
+                    <a:noFill/>
+                  </a:tcPr>
+                </a:tc>
+                <a:tc>
+                  <a:txBody>
+                    <a:bodyPr/>
+                    <a:lstStyle/>
+                    <a:p>
+                      <a:pPr marL="0" marR="0" indent="0" algn="l" defTabSz="457200" rtl="0" eaLnBrk="1" fontAlgn="auto" latinLnBrk="0" hangingPunct="1">
+                        <a:lnSpc>
+                          <a:spcPct val="100000"/>
+                        </a:lnSpc>
+                        <a:spcBef>
+                          <a:spcPts val="0"/>
+                        </a:spcBef>
+                        <a:spcAft>
+                          <a:spcPts val="0"/>
+                        </a:spcAft>
+                        <a:buClrTx/>
+                        <a:buSzTx/>
+                        <a:buFontTx/>
+                        <a:buNone/>
+                        <a:tabLst/>
+                        <a:defRPr/>
+                      </a:pPr>
+                      <a:r>
+                        <a:rPr lang="en-US" sz="2800" u="none" baseline="0" dirty="0" smtClean="0">
+                          <a:solidFill>
+                            <a:schemeClr val="tx1"/>
+                          </a:solidFill>
+                        </a:rPr>
+                        <a:t>Fragments</a:t>
+                      </a:r>
+                      <a:endParaRPr lang="en-US" sz="2800" u="none" dirty="0" smtClean="0">
+                        <a:solidFill>
+                          <a:schemeClr val="tx1"/>
+                        </a:solidFill>
+                      </a:endParaRPr>
+                    </a:p>
+                  </a:txBody>
+                  <a:tcPr>
+                    <a:noFill/>
+                  </a:tcPr>
+                </a:tc>
+              </a:tr>
+              <a:tr h="985861">
                 <a:tc>
                   <a:txBody>
                     <a:bodyPr/>
@@ -7451,7 +7512,7 @@
                   </a:tcPr>
                 </a:tc>
               </a:tr>
-              <a:tr h="525177">
+              <a:tr h="540633">
                 <a:tc>
                   <a:txBody>
                     <a:bodyPr/>
@@ -7497,7 +7558,7 @@
                   <a:tcPr/>
                 </a:tc>
               </a:tr>
-              <a:tr h="525177">
+              <a:tr h="540633">
                 <a:tc>
                   <a:txBody>
                     <a:bodyPr/>
@@ -7548,7 +7609,7 @@
                   <a:tcPr/>
                 </a:tc>
               </a:tr>
-              <a:tr h="957676">
+              <a:tr h="985861">
                 <a:tc>
                   <a:txBody>
                     <a:bodyPr/>
@@ -7594,7 +7655,7 @@
                   <a:tcPr/>
                 </a:tc>
               </a:tr>
-              <a:tr h="525177">
+              <a:tr h="540633">
                 <a:tc>
                   <a:txBody>
                     <a:bodyPr/>
@@ -7808,7 +7869,7 @@
           <a:graphicData uri="http://schemas.openxmlformats.org/presentationml/2006/ole">
             <mc:AlternateContent xmlns:mc="http://schemas.openxmlformats.org/markup-compatibility/2006">
               <mc:Choice xmlns:v="urn:schemas-microsoft-com:vml" Requires="v">
-                <p:oleObj spid="_x0000_s11278" name="Document" r:id="rId3" imgW="6864119" imgH="4678614" progId="Word.Document.12">
+                <p:oleObj spid="_x0000_s11283" name="Document" r:id="rId3" imgW="6864119" imgH="4678614" progId="Word.Document.12">
                   <p:embed/>
                 </p:oleObj>
               </mc:Choice>
@@ -8007,7 +8068,7 @@
           <a:graphicData uri="http://schemas.openxmlformats.org/presentationml/2006/ole">
             <mc:AlternateContent xmlns:mc="http://schemas.openxmlformats.org/markup-compatibility/2006">
               <mc:Choice xmlns:v="urn:schemas-microsoft-com:vml" Requires="v">
-                <p:oleObj spid="_x0000_s12302" name="Document" r:id="rId3" imgW="6864119" imgH="2858612" progId="Word.Document.12">
+                <p:oleObj spid="_x0000_s12307" name="Document" r:id="rId3" imgW="6864119" imgH="2858612" progId="Word.Document.12">
                   <p:embed/>
                 </p:oleObj>
               </mc:Choice>
@@ -8206,7 +8267,7 @@
           <a:graphicData uri="http://schemas.openxmlformats.org/presentationml/2006/ole">
             <mc:AlternateContent xmlns:mc="http://schemas.openxmlformats.org/markup-compatibility/2006">
               <mc:Choice xmlns:v="urn:schemas-microsoft-com:vml" Requires="v">
-                <p:oleObj spid="_x0000_s13327" name="Document" r:id="rId3" imgW="6858000" imgH="4610100" progId="Word.Document.12">
+                <p:oleObj spid="_x0000_s13332" name="Document" r:id="rId3" imgW="6858000" imgH="4610100" progId="Word.Document.12">
                   <p:embed/>
                 </p:oleObj>
               </mc:Choice>
@@ -8405,7 +8466,7 @@
           <a:graphicData uri="http://schemas.openxmlformats.org/presentationml/2006/ole">
             <mc:AlternateContent xmlns:mc="http://schemas.openxmlformats.org/markup-compatibility/2006">
               <mc:Choice xmlns:v="urn:schemas-microsoft-com:vml" Requires="v">
-                <p:oleObj spid="_x0000_s14350" name="Document" r:id="rId3" imgW="6864119" imgH="4880636" progId="Word.Document.12">
+                <p:oleObj spid="_x0000_s14355" name="Document" r:id="rId3" imgW="6864119" imgH="4880636" progId="Word.Document.12">
                   <p:embed/>
                 </p:oleObj>
               </mc:Choice>
@@ -8604,7 +8665,7 @@
           <a:graphicData uri="http://schemas.openxmlformats.org/presentationml/2006/ole">
             <mc:AlternateContent xmlns:mc="http://schemas.openxmlformats.org/markup-compatibility/2006">
               <mc:Choice xmlns:v="urn:schemas-microsoft-com:vml" Requires="v">
-                <p:oleObj spid="_x0000_s15374" name="Document" r:id="rId3" imgW="6864119" imgH="3060634" progId="Word.Document.12">
+                <p:oleObj spid="_x0000_s15379" name="Document" r:id="rId3" imgW="6864119" imgH="3060634" progId="Word.Document.12">
                   <p:embed/>
                 </p:oleObj>
               </mc:Choice>
@@ -8803,7 +8864,7 @@
           <a:graphicData uri="http://schemas.openxmlformats.org/presentationml/2006/ole">
             <mc:AlternateContent xmlns:mc="http://schemas.openxmlformats.org/markup-compatibility/2006">
               <mc:Choice xmlns:v="urn:schemas-microsoft-com:vml" Requires="v">
-                <p:oleObj spid="_x0000_s16398" name="Document" r:id="rId3" imgW="6864119" imgH="4274570" progId="Word.Document.12">
+                <p:oleObj spid="_x0000_s16403" name="Document" r:id="rId3" imgW="6864119" imgH="4274570" progId="Word.Document.12">
                   <p:embed/>
                 </p:oleObj>
               </mc:Choice>
@@ -9002,7 +9063,7 @@
           <a:graphicData uri="http://schemas.openxmlformats.org/presentationml/2006/ole">
             <mc:AlternateContent xmlns:mc="http://schemas.openxmlformats.org/markup-compatibility/2006">
               <mc:Choice xmlns:v="urn:schemas-microsoft-com:vml" Requires="v">
-                <p:oleObj spid="_x0000_s17422" name="Document" r:id="rId3" imgW="6864119" imgH="5286484" progId="Word.Document.12">
+                <p:oleObj spid="_x0000_s17427" name="Document" r:id="rId3" imgW="6864119" imgH="5286484" progId="Word.Document.12">
                   <p:embed/>
                 </p:oleObj>
               </mc:Choice>
@@ -9201,7 +9262,7 @@
           <a:graphicData uri="http://schemas.openxmlformats.org/presentationml/2006/ole">
             <mc:AlternateContent xmlns:mc="http://schemas.openxmlformats.org/markup-compatibility/2006">
               <mc:Choice xmlns:v="urn:schemas-microsoft-com:vml" Requires="v">
-                <p:oleObj spid="_x0000_s18446" name="Document" r:id="rId3" imgW="7220116" imgH="4542970" progId="Word.Document.12">
+                <p:oleObj spid="_x0000_s18451" name="Document" r:id="rId3" imgW="7220116" imgH="4542970" progId="Word.Document.12">
                   <p:embed/>
                 </p:oleObj>
               </mc:Choice>
@@ -9491,7 +9552,7 @@
           <a:graphicData uri="http://schemas.openxmlformats.org/presentationml/2006/ole">
             <mc:AlternateContent xmlns:mc="http://schemas.openxmlformats.org/markup-compatibility/2006">
               <mc:Choice xmlns:v="urn:schemas-microsoft-com:vml" Requires="v">
-                <p:oleObj spid="_x0000_s19479" name="Document" r:id="rId3" imgW="6965729" imgH="801234" progId="Word.Document.12">
+                <p:oleObj spid="_x0000_s19488" name="Document" r:id="rId3" imgW="6965729" imgH="801234" progId="Word.Document.12">
                   <p:embed/>
                 </p:oleObj>
               </mc:Choice>
@@ -9548,7 +9609,7 @@
           <a:graphicData uri="http://schemas.openxmlformats.org/presentationml/2006/ole">
             <mc:AlternateContent xmlns:mc="http://schemas.openxmlformats.org/markup-compatibility/2006">
               <mc:Choice xmlns:v="urn:schemas-microsoft-com:vml" Requires="v">
-                <p:oleObj spid="_x0000_s19480" r:id="rId5" imgW="2961415" imgH="3075761" progId="Visio.Drawing.11">
+                <p:oleObj spid="_x0000_s19489" r:id="rId5" imgW="2961415" imgH="3075761" progId="Visio.Drawing.11">
                   <p:embed/>
                 </p:oleObj>
               </mc:Choice>
@@ -9587,7 +9648,7 @@
                       <a:noFill/>
                       <a:extLst>
                         <a:ext uri="{909E8E84-426E-40dd-AFC4-6F175D3DCCD1}">
-                          <a14:hiddenFill xmlns:a14="http://schemas.microsoft.com/office/drawing/2010/main">
+                          <a14:hiddenFill xmlns:a14="http://schemas.microsoft.com/office/drawing/2010/main" xmlns="">
                             <a:solidFill>
                               <a:srgbClr val="FFFFFF"/>
                             </a:solidFill>
@@ -10489,7 +10550,7 @@
           <a:graphicData uri="http://schemas.openxmlformats.org/presentationml/2006/ole">
             <mc:AlternateContent xmlns:mc="http://schemas.openxmlformats.org/markup-compatibility/2006">
               <mc:Choice xmlns:v="urn:schemas-microsoft-com:vml" Requires="v">
-                <p:oleObj spid="_x0000_s23566" name="Document" r:id="rId3" imgW="8305800" imgH="4686300" progId="Word.Document.12">
+                <p:oleObj spid="_x0000_s23571" name="Document" r:id="rId3" imgW="8305800" imgH="4686300" progId="Word.Document.12">
                   <p:embed/>
                 </p:oleObj>
               </mc:Choice>
@@ -11423,7 +11484,7 @@
           <a:graphicData uri="http://schemas.openxmlformats.org/presentationml/2006/ole">
             <mc:AlternateContent xmlns:mc="http://schemas.openxmlformats.org/markup-compatibility/2006">
               <mc:Choice xmlns:v="urn:schemas-microsoft-com:vml" Requires="v">
-                <p:oleObj spid="_x0000_s20493" name="Document" r:id="rId3" imgW="6864119" imgH="4844200" progId="Word.Document.12">
+                <p:oleObj spid="_x0000_s20498" name="Document" r:id="rId3" imgW="6864119" imgH="4844200" progId="Word.Document.12">
                   <p:embed/>
                 </p:oleObj>
               </mc:Choice>
@@ -11622,7 +11683,7 @@
           <a:graphicData uri="http://schemas.openxmlformats.org/presentationml/2006/ole">
             <mc:AlternateContent xmlns:mc="http://schemas.openxmlformats.org/markup-compatibility/2006">
               <mc:Choice xmlns:v="urn:schemas-microsoft-com:vml" Requires="v">
-                <p:oleObj spid="_x0000_s21517" name="Document" r:id="rId3" imgW="6864119" imgH="4844200" progId="Word.Document.12">
+                <p:oleObj spid="_x0000_s21522" name="Document" r:id="rId3" imgW="6864119" imgH="4844200" progId="Word.Document.12">
                   <p:embed/>
                 </p:oleObj>
               </mc:Choice>
@@ -11821,7 +11882,7 @@
           <a:graphicData uri="http://schemas.openxmlformats.org/presentationml/2006/ole">
             <mc:AlternateContent xmlns:mc="http://schemas.openxmlformats.org/markup-compatibility/2006">
               <mc:Choice xmlns:v="urn:schemas-microsoft-com:vml" Requires="v">
-                <p:oleObj spid="_x0000_s22541" name="Document" r:id="rId3" imgW="7423337" imgH="5268807" progId="Word.Document.12">
+                <p:oleObj spid="_x0000_s22546" name="Document" r:id="rId3" imgW="7423337" imgH="5268807" progId="Word.Document.12">
                   <p:embed/>
                 </p:oleObj>
               </mc:Choice>
@@ -12263,20 +12324,20 @@
           <p:nvPr>
             <p:extLst>
               <p:ext uri="{D42A27DB-BD31-4B8C-83A1-F6EECF244321}">
-                <p14:modId xmlns:p14="http://schemas.microsoft.com/office/powerpoint/2010/main" val="3580923560"/>
+                <p14:modId xmlns:p14="http://schemas.microsoft.com/office/powerpoint/2010/main" val="498893502"/>
               </p:ext>
             </p:extLst>
           </p:nvPr>
         </p:nvGraphicFramePr>
         <p:xfrm>
-          <a:off x="917575" y="520878"/>
-          <a:ext cx="6858000" cy="4079875"/>
+          <a:off x="510231" y="477848"/>
+          <a:ext cx="8129719" cy="4836430"/>
         </p:xfrm>
         <a:graphic>
           <a:graphicData uri="http://schemas.openxmlformats.org/presentationml/2006/ole">
             <mc:AlternateContent xmlns:mc="http://schemas.openxmlformats.org/markup-compatibility/2006">
               <mc:Choice xmlns:v="urn:schemas-microsoft-com:vml" Requires="v">
-                <p:oleObj spid="_x0000_s4111" name="Document" r:id="rId3" imgW="6858000" imgH="4089400" progId="Word.Document.12">
+                <p:oleObj spid="_x0000_s4116" name="Document" r:id="rId3" imgW="6858000" imgH="4089400" progId="Word.Document.12">
                   <p:embed/>
                 </p:oleObj>
               </mc:Choice>
@@ -12297,8 +12358,8 @@
                     </p:blipFill>
                     <p:spPr>
                       <a:xfrm>
-                        <a:off x="917575" y="520878"/>
-                        <a:ext cx="6858000" cy="4079875"/>
+                        <a:off x="510231" y="477848"/>
+                        <a:ext cx="8129719" cy="4836430"/>
                       </a:xfrm>
                       <a:prstGeom prst="rect">
                         <a:avLst/>
@@ -12462,20 +12523,20 @@
           <p:nvPr>
             <p:extLst>
               <p:ext uri="{D42A27DB-BD31-4B8C-83A1-F6EECF244321}">
-                <p14:modId xmlns:p14="http://schemas.microsoft.com/office/powerpoint/2010/main" val="3257894265"/>
+                <p14:modId xmlns:p14="http://schemas.microsoft.com/office/powerpoint/2010/main" val="563266739"/>
               </p:ext>
             </p:extLst>
           </p:nvPr>
         </p:nvGraphicFramePr>
         <p:xfrm>
-          <a:off x="914400" y="860563"/>
-          <a:ext cx="6864350" cy="4678362"/>
+          <a:off x="665181" y="279649"/>
+          <a:ext cx="8143539" cy="5550187"/>
         </p:xfrm>
         <a:graphic>
           <a:graphicData uri="http://schemas.openxmlformats.org/presentationml/2006/ole">
             <mc:AlternateContent xmlns:mc="http://schemas.openxmlformats.org/markup-compatibility/2006">
               <mc:Choice xmlns:v="urn:schemas-microsoft-com:vml" Requires="v">
-                <p:oleObj spid="_x0000_s5135" name="Document" r:id="rId3" imgW="6864119" imgH="4687993" progId="Word.Document.12">
+                <p:oleObj spid="_x0000_s5140" name="Document" r:id="rId3" imgW="6864119" imgH="4687993" progId="Word.Document.12">
                   <p:embed/>
                 </p:oleObj>
               </mc:Choice>
@@ -12496,8 +12557,8 @@
                     </p:blipFill>
                     <p:spPr>
                       <a:xfrm>
-                        <a:off x="914400" y="860563"/>
-                        <a:ext cx="6864350" cy="4678362"/>
+                        <a:off x="665181" y="279649"/>
+                        <a:ext cx="8143539" cy="5550187"/>
                       </a:xfrm>
                       <a:prstGeom prst="rect">
                         <a:avLst/>
@@ -12610,7 +12671,11 @@
           <a:p>
             <a:r>
               <a:rPr lang="en-US" dirty="0" smtClean="0"/>
-              <a:t>APIs used for parsing XML</a:t>
+              <a:t>Java Libraries </a:t>
+            </a:r>
+            <a:r>
+              <a:rPr lang="en-US" dirty="0" smtClean="0"/>
+              <a:t>used for parsing XML</a:t>
             </a:r>
           </a:p>
           <a:p>
@@ -12656,11 +12721,7 @@
             <a:pPr lvl="2"/>
             <a:r>
               <a:rPr lang="en-US" dirty="0" smtClean="0"/>
-              <a:t>The </a:t>
-            </a:r>
-            <a:r>
-              <a:rPr lang="en-US" smtClean="0"/>
-              <a:t>DOM API can </a:t>
+              <a:t>The DOM API can </a:t>
             </a:r>
             <a:r>
               <a:rPr lang="en-US" dirty="0"/>

</xml_diff>